<commit_message>
updated midterm with corrections
</commit_message>
<xml_diff>
--- a/ENGR 360 midterm formula sheet.pptx
+++ b/ENGR 360 midterm formula sheet.pptx
@@ -1558,110 +1558,6 @@
 </p:sldLayout>
 </file>
 
-<file path=ppt/slideLayouts/slideLayout11.xml><?xml version="1.0" encoding="utf-8"?>
-<p:sldLayout xmlns:a="http://schemas.openxmlformats.org/drawingml/2006/main" xmlns:r="http://schemas.openxmlformats.org/officeDocument/2006/relationships" xmlns:p="http://schemas.openxmlformats.org/presentationml/2006/main" matchingName="Blank" type="blank">
-  <p:cSld name="BLANK">
-    <p:spTree>
-      <p:nvGrpSpPr>
-        <p:cNvPr id="1" name="Shape 48"/>
-        <p:cNvGrpSpPr/>
-        <p:nvPr/>
-      </p:nvGrpSpPr>
-      <p:grpSpPr>
-        <a:xfrm>
-          <a:off x="0" y="0"/>
-          <a:ext cx="0" cy="0"/>
-          <a:chOff x="0" y="0"/>
-          <a:chExt cx="0" cy="0"/>
-        </a:xfrm>
-      </p:grpSpPr>
-      <p:sp>
-        <p:nvSpPr>
-          <p:cNvPr id="49" name="Google Shape;49;p12"/>
-          <p:cNvSpPr txBox="1">
-            <a:spLocks noGrp="1"/>
-          </p:cNvSpPr>
-          <p:nvPr>
-            <p:ph type="sldNum" idx="12"/>
-          </p:nvPr>
-        </p:nvSpPr>
-        <p:spPr>
-          <a:xfrm>
-            <a:off x="7338349" y="9138763"/>
-            <a:ext cx="475200" cy="771300"/>
-          </a:xfrm>
-          <a:prstGeom prst="rect">
-            <a:avLst/>
-          </a:prstGeom>
-        </p:spPr>
-        <p:txBody>
-          <a:bodyPr spcFirstLastPara="1" wrap="square" lIns="91425" tIns="91425" rIns="91425" bIns="91425" anchor="ctr" anchorCtr="0">
-            <a:normAutofit/>
-          </a:bodyPr>
-          <a:lstStyle>
-            <a:lvl1pPr lvl="0">
-              <a:buNone/>
-              <a:defRPr/>
-            </a:lvl1pPr>
-            <a:lvl2pPr lvl="1">
-              <a:buNone/>
-              <a:defRPr/>
-            </a:lvl2pPr>
-            <a:lvl3pPr lvl="2">
-              <a:buNone/>
-              <a:defRPr/>
-            </a:lvl3pPr>
-            <a:lvl4pPr lvl="3">
-              <a:buNone/>
-              <a:defRPr/>
-            </a:lvl4pPr>
-            <a:lvl5pPr lvl="4">
-              <a:buNone/>
-              <a:defRPr/>
-            </a:lvl5pPr>
-            <a:lvl6pPr lvl="5">
-              <a:buNone/>
-              <a:defRPr/>
-            </a:lvl6pPr>
-            <a:lvl7pPr lvl="6">
-              <a:buNone/>
-              <a:defRPr/>
-            </a:lvl7pPr>
-            <a:lvl8pPr lvl="7">
-              <a:buNone/>
-              <a:defRPr/>
-            </a:lvl8pPr>
-            <a:lvl9pPr lvl="8">
-              <a:buNone/>
-              <a:defRPr/>
-            </a:lvl9pPr>
-          </a:lstStyle>
-          <a:p>
-            <a:pPr marL="0" lvl="0" indent="0" algn="r" rtl="0">
-              <a:spcBef>
-                <a:spcPts val="0"/>
-              </a:spcBef>
-              <a:spcAft>
-                <a:spcPts val="0"/>
-              </a:spcAft>
-              <a:buNone/>
-            </a:pPr>
-            <a:fld id="{00000000-1234-1234-1234-123412341234}" type="slidenum">
-              <a:rPr lang="en-CA"/>
-              <a:t>‹#›</a:t>
-            </a:fld>
-            <a:endParaRPr/>
-          </a:p>
-        </p:txBody>
-      </p:sp>
-    </p:spTree>
-  </p:cSld>
-  <p:clrMapOvr>
-    <a:masterClrMapping/>
-  </p:clrMapOvr>
-</p:sldLayout>
-</file>
-
 <file path=ppt/slideLayouts/slideLayout2.xml><?xml version="1.0" encoding="utf-8"?>
 <p:sldLayout xmlns:a="http://schemas.openxmlformats.org/drawingml/2006/main" xmlns:r="http://schemas.openxmlformats.org/officeDocument/2006/relationships" xmlns:p="http://schemas.openxmlformats.org/presentationml/2006/main" matchingName="Section header" type="secHead">
   <p:cSld name="SECTION_HEADER">
@@ -4859,7 +4755,6 @@
     <p:sldLayoutId id="2147483655" r:id="rId8"/>
     <p:sldLayoutId id="2147483656" r:id="rId9"/>
     <p:sldLayoutId id="2147483657" r:id="rId10"/>
-    <p:sldLayoutId id="2147483658" r:id="rId11"/>
   </p:sldLayoutIdLst>
   <p:hf sldNum="0" hdr="0" ftr="0" dt="0"/>
   <p:txStyles>
@@ -5867,8 +5762,8 @@
           </a:p>
         </p:txBody>
       </p:sp>
-      <mc:AlternateContent xmlns:mc="http://schemas.openxmlformats.org/markup-compatibility/2006">
-        <mc:Choice xmlns:a14="http://schemas.microsoft.com/office/drawing/2010/main" Requires="a14">
+      <mc:AlternateContent xmlns:mc="http://schemas.openxmlformats.org/markup-compatibility/2006" xmlns:a14="http://schemas.microsoft.com/office/drawing/2010/main">
+        <mc:Choice Requires="a14">
           <p:sp>
             <p:nvSpPr>
               <p:cNvPr id="56" name="Google Shape;56;p13"/>
@@ -7432,7 +7327,7 @@
                     <m:sSup>
                       <m:sSupPr>
                         <m:ctrlPr>
-                          <a:rPr lang="en-CA" sz="900" b="0" i="0" smtClean="0">
+                          <a:rPr lang="en-CA" sz="900" b="0" i="1" smtClean="0">
                             <a:latin typeface="Cambria Math" panose="02040503050406030204" pitchFamily="18" charset="0"/>
                             <a:ea typeface="Cambria Math" panose="02040503050406030204" pitchFamily="18" charset="0"/>
                             <a:cs typeface="Comic Sans MS"/>
@@ -7708,7 +7603,7 @@
                         <m:d>
                           <m:dPr>
                             <m:ctrlPr>
-                              <a:rPr lang="en-CA" sz="900" b="0" i="0" smtClean="0">
+                              <a:rPr lang="en-CA" sz="900" b="0" i="1" smtClean="0">
                                 <a:latin typeface="Cambria Math" panose="02040503050406030204" pitchFamily="18" charset="0"/>
                                 <a:ea typeface="Cambria Math" panose="02040503050406030204" pitchFamily="18" charset="0"/>
                                 <a:cs typeface="Comic Sans MS"/>
@@ -8442,7 +8337,7 @@
             </p:txBody>
           </p:sp>
         </mc:Choice>
-        <mc:Fallback>
+        <mc:Fallback xmlns="">
           <p:sp>
             <p:nvSpPr>
               <p:cNvPr id="56" name="Google Shape;56;p13"/>
@@ -8484,8 +8379,8 @@
           </p:sp>
         </mc:Fallback>
       </mc:AlternateContent>
-      <mc:AlternateContent xmlns:mc="http://schemas.openxmlformats.org/markup-compatibility/2006">
-        <mc:Choice xmlns:a14="http://schemas.microsoft.com/office/drawing/2010/main" Requires="a14">
+      <mc:AlternateContent xmlns:mc="http://schemas.openxmlformats.org/markup-compatibility/2006" xmlns:a14="http://schemas.microsoft.com/office/drawing/2010/main">
+        <mc:Choice Requires="a14">
           <p:sp>
             <p:nvSpPr>
               <p:cNvPr id="3" name="Google Shape;56;p13">
@@ -10007,7 +9902,7 @@
             </p:txBody>
           </p:sp>
         </mc:Choice>
-        <mc:Fallback>
+        <mc:Fallback xmlns="">
           <p:sp>
             <p:nvSpPr>
               <p:cNvPr id="3" name="Google Shape;56;p13">
@@ -10055,8 +9950,8 @@
           </p:sp>
         </mc:Fallback>
       </mc:AlternateContent>
-      <mc:AlternateContent xmlns:mc="http://schemas.openxmlformats.org/markup-compatibility/2006">
-        <mc:Choice xmlns:a14="http://schemas.microsoft.com/office/drawing/2010/main" Requires="a14">
+      <mc:AlternateContent xmlns:mc="http://schemas.openxmlformats.org/markup-compatibility/2006" xmlns:a14="http://schemas.microsoft.com/office/drawing/2010/main">
+        <mc:Choice Requires="a14">
           <p:sp>
             <p:nvSpPr>
               <p:cNvPr id="7" name="Google Shape;56;p13">
@@ -10104,7 +9999,7 @@
                     <a:cs typeface="Comic Sans MS"/>
                     <a:sym typeface="Comic Sans MS"/>
                   </a:rPr>
-                  <a:t>More probability shit</a:t>
+                  <a:t>More probability</a:t>
                 </a:r>
               </a:p>
               <a:p>
@@ -11967,7 +11862,7 @@
             </p:txBody>
           </p:sp>
         </mc:Choice>
-        <mc:Fallback>
+        <mc:Fallback xmlns="">
           <p:sp>
             <p:nvSpPr>
               <p:cNvPr id="7" name="Google Shape;56;p13">
@@ -12015,8 +11910,8 @@
           </p:sp>
         </mc:Fallback>
       </mc:AlternateContent>
-      <mc:AlternateContent xmlns:mc="http://schemas.openxmlformats.org/markup-compatibility/2006">
-        <mc:Choice xmlns:a14="http://schemas.microsoft.com/office/drawing/2010/main" Requires="a14">
+      <mc:AlternateContent xmlns:mc="http://schemas.openxmlformats.org/markup-compatibility/2006" xmlns:a14="http://schemas.microsoft.com/office/drawing/2010/main">
+        <mc:Choice Requires="a14">
           <p:sp>
             <p:nvSpPr>
               <p:cNvPr id="8" name="Google Shape;56;p13">
@@ -12031,8 +11926,8 @@
             </p:nvSpPr>
             <p:spPr>
               <a:xfrm>
-                <a:off x="0" y="9086565"/>
-                <a:ext cx="5382563" cy="877133"/>
+                <a:off x="-16668" y="8975671"/>
+                <a:ext cx="1669397" cy="1154132"/>
               </a:xfrm>
               <a:prstGeom prst="rect">
                 <a:avLst/>
@@ -12382,7 +12277,7 @@
             </p:txBody>
           </p:sp>
         </mc:Choice>
-        <mc:Fallback>
+        <mc:Fallback xmlns="">
           <p:sp>
             <p:nvSpPr>
               <p:cNvPr id="8" name="Google Shape;56;p13">
@@ -12399,8 +12294,8 @@
             </p:nvSpPr>
             <p:spPr>
               <a:xfrm>
-                <a:off x="0" y="9086565"/>
-                <a:ext cx="5382563" cy="877133"/>
+                <a:off x="-16668" y="8975671"/>
+                <a:ext cx="1669397" cy="1154132"/>
               </a:xfrm>
               <a:prstGeom prst="rect">
                 <a:avLst/>
@@ -12430,8 +12325,8 @@
           </p:sp>
         </mc:Fallback>
       </mc:AlternateContent>
-      <mc:AlternateContent xmlns:mc="http://schemas.openxmlformats.org/markup-compatibility/2006">
-        <mc:Choice xmlns:a14="http://schemas.microsoft.com/office/drawing/2010/main" Requires="a14">
+      <mc:AlternateContent xmlns:mc="http://schemas.openxmlformats.org/markup-compatibility/2006" xmlns:a14="http://schemas.microsoft.com/office/drawing/2010/main">
+        <mc:Choice Requires="a14">
           <p:sp>
             <p:nvSpPr>
               <p:cNvPr id="10" name="Google Shape;56;p13">
@@ -13423,7 +13318,14 @@
                                   <a:latin typeface="Cambria Math" panose="02040503050406030204" pitchFamily="18" charset="0"/>
                                   <a:sym typeface="Comic Sans MS"/>
                                 </a:rPr>
-                                <m:t>  </m:t>
+                                <m:t> </m:t>
+                              </m:r>
+                              <m:r>
+                                <a:rPr lang="en-CA" sz="900" b="0" i="1" smtClean="0">
+                                  <a:latin typeface="Cambria Math" panose="02040503050406030204" pitchFamily="18" charset="0"/>
+                                  <a:sym typeface="Comic Sans MS"/>
+                                </a:rPr>
+                                <m:t> </m:t>
                               </m:r>
                               <m:r>
                                 <a:rPr lang="en-CA" sz="900" b="0" i="1" smtClean="0">
@@ -13534,7 +13436,7 @@
             </p:txBody>
           </p:sp>
         </mc:Choice>
-        <mc:Fallback>
+        <mc:Fallback xmlns="">
           <p:sp>
             <p:nvSpPr>
               <p:cNvPr id="10" name="Google Shape;56;p13">
@@ -13582,8 +13484,8 @@
           </p:sp>
         </mc:Fallback>
       </mc:AlternateContent>
-      <mc:AlternateContent xmlns:mc="http://schemas.openxmlformats.org/markup-compatibility/2006">
-        <mc:Choice xmlns:a14="http://schemas.microsoft.com/office/drawing/2010/main" Requires="a14">
+      <mc:AlternateContent xmlns:mc="http://schemas.openxmlformats.org/markup-compatibility/2006" xmlns:a14="http://schemas.microsoft.com/office/drawing/2010/main">
+        <mc:Choice Requires="a14">
           <p:sp>
             <p:nvSpPr>
               <p:cNvPr id="15" name="Google Shape;56;p13">
@@ -13872,7 +13774,14 @@
                               <a:latin typeface="Cambria Math" panose="02040503050406030204" pitchFamily="18" charset="0"/>
                               <a:sym typeface="Comic Sans MS"/>
                             </a:rPr>
-                            <m:t>  </m:t>
+                            <m:t> </m:t>
+                          </m:r>
+                          <m:r>
+                            <a:rPr lang="en-CA" sz="900" b="0" i="1" dirty="0" smtClean="0">
+                              <a:latin typeface="Cambria Math" panose="02040503050406030204" pitchFamily="18" charset="0"/>
+                              <a:sym typeface="Comic Sans MS"/>
+                            </a:rPr>
+                            <m:t> </m:t>
                           </m:r>
                           <m:r>
                             <a:rPr lang="en-CA" sz="900" b="0" i="1" dirty="0" smtClean="0">
@@ -14333,7 +14242,7 @@
             </p:txBody>
           </p:sp>
         </mc:Choice>
-        <mc:Fallback>
+        <mc:Fallback xmlns="">
           <p:sp>
             <p:nvSpPr>
               <p:cNvPr id="15" name="Google Shape;56;p13">
@@ -14381,8 +14290,8 @@
           </p:sp>
         </mc:Fallback>
       </mc:AlternateContent>
-      <mc:AlternateContent xmlns:mc="http://schemas.openxmlformats.org/markup-compatibility/2006">
-        <mc:Choice xmlns:a14="http://schemas.microsoft.com/office/drawing/2010/main" Requires="a14">
+      <mc:AlternateContent xmlns:mc="http://schemas.openxmlformats.org/markup-compatibility/2006" xmlns:a14="http://schemas.microsoft.com/office/drawing/2010/main">
+        <mc:Choice Requires="a14">
           <p:sp>
             <p:nvSpPr>
               <p:cNvPr id="16" name="Google Shape;56;p13">
@@ -14397,8 +14306,8 @@
             </p:nvSpPr>
             <p:spPr>
               <a:xfrm>
-                <a:off x="2216090" y="9201329"/>
-                <a:ext cx="5382563" cy="753125"/>
+                <a:off x="1464258" y="9023690"/>
+                <a:ext cx="1669397" cy="1030124"/>
               </a:xfrm>
               <a:prstGeom prst="rect">
                 <a:avLst/>
@@ -15079,7 +14988,7 @@
             </p:txBody>
           </p:sp>
         </mc:Choice>
-        <mc:Fallback>
+        <mc:Fallback xmlns="">
           <p:sp>
             <p:nvSpPr>
               <p:cNvPr id="16" name="Google Shape;56;p13">
@@ -15096,8 +15005,8 @@
             </p:nvSpPr>
             <p:spPr>
               <a:xfrm>
-                <a:off x="2216090" y="9201329"/>
-                <a:ext cx="5382563" cy="753125"/>
+                <a:off x="1464258" y="9023690"/>
+                <a:ext cx="1669397" cy="1030124"/>
               </a:xfrm>
               <a:prstGeom prst="rect">
                 <a:avLst/>
@@ -15105,7 +15014,7 @@
               <a:blipFill>
                 <a:blip r:embed="rId9"/>
                 <a:stretch>
-                  <a:fillRect b="-34677"/>
+                  <a:fillRect b="-25444"/>
                 </a:stretch>
               </a:blipFill>
               <a:ln>
@@ -15127,8 +15036,8 @@
           </p:sp>
         </mc:Fallback>
       </mc:AlternateContent>
-      <mc:AlternateContent xmlns:mc="http://schemas.openxmlformats.org/markup-compatibility/2006">
-        <mc:Choice xmlns:a14="http://schemas.microsoft.com/office/drawing/2010/main" Requires="a14">
+      <mc:AlternateContent xmlns:mc="http://schemas.openxmlformats.org/markup-compatibility/2006" xmlns:a14="http://schemas.microsoft.com/office/drawing/2010/main">
+        <mc:Choice Requires="a14">
           <p:sp>
             <p:nvSpPr>
               <p:cNvPr id="17" name="Google Shape;56;p13">
@@ -15595,7 +15504,7 @@
             </p:txBody>
           </p:sp>
         </mc:Choice>
-        <mc:Fallback>
+        <mc:Fallback xmlns="">
           <p:sp>
             <p:nvSpPr>
               <p:cNvPr id="17" name="Google Shape;56;p13">
@@ -15643,8 +15552,8 @@
           </p:sp>
         </mc:Fallback>
       </mc:AlternateContent>
-      <mc:AlternateContent xmlns:mc="http://schemas.openxmlformats.org/markup-compatibility/2006">
-        <mc:Choice xmlns:a14="http://schemas.microsoft.com/office/drawing/2010/main" Requires="a14">
+      <mc:AlternateContent xmlns:mc="http://schemas.openxmlformats.org/markup-compatibility/2006" xmlns:a14="http://schemas.microsoft.com/office/drawing/2010/main">
+        <mc:Choice Requires="a14">
           <p:sp>
             <p:nvSpPr>
               <p:cNvPr id="18" name="TextBox 17">
@@ -16140,7 +16049,7 @@
             </p:txBody>
           </p:sp>
         </mc:Choice>
-        <mc:Fallback>
+        <mc:Fallback xmlns="">
           <p:sp>
             <p:nvSpPr>
               <p:cNvPr id="18" name="TextBox 17">
@@ -16185,8 +16094,8 @@
           </p:sp>
         </mc:Fallback>
       </mc:AlternateContent>
-      <mc:AlternateContent xmlns:mc="http://schemas.openxmlformats.org/markup-compatibility/2006">
-        <mc:Choice xmlns:a14="http://schemas.microsoft.com/office/drawing/2010/main" Requires="a14">
+      <mc:AlternateContent xmlns:mc="http://schemas.openxmlformats.org/markup-compatibility/2006" xmlns:a14="http://schemas.microsoft.com/office/drawing/2010/main">
+        <mc:Choice Requires="a14">
           <p:sp>
             <p:nvSpPr>
               <p:cNvPr id="19" name="TextBox 18">
@@ -17302,7 +17211,7 @@
                   <a:rPr lang="en-CA" sz="900" dirty="0">
                     <a:latin typeface="Comic Sans MS" panose="030F0702030302020204" pitchFamily="66" charset="0"/>
                   </a:rPr>
-                  <a:t>Also variance ffs: </a:t>
+                  <a:t>Also variance: </a:t>
                 </a:r>
                 <a14:m>
                   <m:oMath xmlns:m="http://schemas.openxmlformats.org/officeDocument/2006/math">
@@ -17563,7 +17472,7 @@
             </p:txBody>
           </p:sp>
         </mc:Choice>
-        <mc:Fallback>
+        <mc:Fallback xmlns="">
           <p:sp>
             <p:nvSpPr>
               <p:cNvPr id="19" name="TextBox 18">
@@ -17608,8 +17517,8 @@
           </p:sp>
         </mc:Fallback>
       </mc:AlternateContent>
-      <mc:AlternateContent xmlns:mc="http://schemas.openxmlformats.org/markup-compatibility/2006">
-        <mc:Choice xmlns:a14="http://schemas.microsoft.com/office/drawing/2010/main" Requires="a14">
+      <mc:AlternateContent xmlns:mc="http://schemas.openxmlformats.org/markup-compatibility/2006" xmlns:a14="http://schemas.microsoft.com/office/drawing/2010/main">
+        <mc:Choice Requires="a14">
           <p:sp>
             <p:nvSpPr>
               <p:cNvPr id="20" name="TextBox 19">
@@ -17958,7 +17867,7 @@
             </p:txBody>
           </p:sp>
         </mc:Choice>
-        <mc:Fallback>
+        <mc:Fallback xmlns="">
           <p:sp>
             <p:nvSpPr>
               <p:cNvPr id="20" name="TextBox 19">
@@ -18003,8 +17912,8 @@
           </p:sp>
         </mc:Fallback>
       </mc:AlternateContent>
-      <mc:AlternateContent xmlns:mc="http://schemas.openxmlformats.org/markup-compatibility/2006">
-        <mc:Choice xmlns:a14="http://schemas.microsoft.com/office/drawing/2010/main" Requires="a14">
+      <mc:AlternateContent xmlns:mc="http://schemas.openxmlformats.org/markup-compatibility/2006" xmlns:a14="http://schemas.microsoft.com/office/drawing/2010/main">
+        <mc:Choice Requires="a14">
           <p:sp>
             <p:nvSpPr>
               <p:cNvPr id="21" name="TextBox 20">
@@ -18037,7 +17946,7 @@
                   <a:rPr lang="en-CA" sz="900" b="1" dirty="0">
                     <a:latin typeface="Comic Sans MS" panose="030F0702030302020204" pitchFamily="66" charset="0"/>
                   </a:rPr>
-                  <a:t>Conditional random variables</a:t>
+                  <a:t>Continuous random variables</a:t>
                 </a:r>
               </a:p>
               <a:p>
@@ -18047,15 +17956,6 @@
                   </a:rPr>
                   <a:t>For things that are not discrete </a:t>
                 </a:r>
-                <a:r>
-                  <a:rPr lang="en-CA" sz="900" dirty="0" err="1">
-                    <a:latin typeface="Comic Sans MS" panose="030F0702030302020204" pitchFamily="66" charset="0"/>
-                  </a:rPr>
-                  <a:t>uwu</a:t>
-                </a:r>
-                <a:endParaRPr lang="en-CA" sz="900" dirty="0">
-                  <a:latin typeface="Comic Sans MS" panose="030F0702030302020204" pitchFamily="66" charset="0"/>
-                </a:endParaRPr>
               </a:p>
               <a:p>
                 <a:r>
@@ -18745,7 +18645,13 @@
                           <a:rPr lang="en-CA" sz="900" b="0" i="1" smtClean="0">
                             <a:latin typeface="Cambria Math" panose="02040503050406030204" pitchFamily="18" charset="0"/>
                           </a:rPr>
-                          <m:t>−∞ </m:t>
+                          <m:t>−</m:t>
+                        </m:r>
+                        <m:r>
+                          <a:rPr lang="en-CA" sz="900" b="0" i="1" smtClean="0">
+                            <a:latin typeface="Cambria Math" panose="02040503050406030204" pitchFamily="18" charset="0"/>
+                          </a:rPr>
+                          <m:t>∞ </m:t>
                         </m:r>
                       </m:sub>
                       <m:sup>
@@ -19167,7 +19073,7 @@
             </p:txBody>
           </p:sp>
         </mc:Choice>
-        <mc:Fallback>
+        <mc:Fallback xmlns="">
           <p:sp>
             <p:nvSpPr>
               <p:cNvPr id="21" name="TextBox 20">
@@ -19212,8 +19118,8 @@
           </p:sp>
         </mc:Fallback>
       </mc:AlternateContent>
-      <mc:AlternateContent xmlns:mc="http://schemas.openxmlformats.org/markup-compatibility/2006">
-        <mc:Choice xmlns:a14="http://schemas.microsoft.com/office/drawing/2010/main" Requires="a14">
+      <mc:AlternateContent xmlns:mc="http://schemas.openxmlformats.org/markup-compatibility/2006" xmlns:a14="http://schemas.microsoft.com/office/drawing/2010/main">
+        <mc:Choice Requires="a14">
           <p:sp>
             <p:nvSpPr>
               <p:cNvPr id="22" name="Google Shape;56;p13">
@@ -20532,7 +20438,7 @@
                     <m:f>
                       <m:fPr>
                         <m:ctrlPr>
-                          <a:rPr lang="en-CA" sz="900" b="0" i="0" smtClean="0">
+                          <a:rPr lang="en-CA" sz="900" b="0" i="1" smtClean="0">
                             <a:latin typeface="Cambria Math" panose="02040503050406030204" pitchFamily="18" charset="0"/>
                             <a:sym typeface="Comic Sans MS"/>
                           </a:rPr>
@@ -20579,7 +20485,7 @@
                         <m:begChr m:val="["/>
                         <m:endChr m:val="]"/>
                         <m:ctrlPr>
-                          <a:rPr lang="en-CA" sz="900" b="0" i="0" smtClean="0">
+                          <a:rPr lang="en-CA" sz="900" b="0" i="1" smtClean="0">
                             <a:latin typeface="Cambria Math" panose="02040503050406030204" pitchFamily="18" charset="0"/>
                             <a:sym typeface="Comic Sans MS"/>
                           </a:rPr>
@@ -20608,7 +20514,7 @@
                     <m:f>
                       <m:fPr>
                         <m:ctrlPr>
-                          <a:rPr lang="en-CA" sz="900" b="0" i="0" smtClean="0">
+                          <a:rPr lang="en-CA" sz="900" b="0" i="1" smtClean="0">
                             <a:latin typeface="Cambria Math" panose="02040503050406030204" pitchFamily="18" charset="0"/>
                             <a:sym typeface="Comic Sans MS"/>
                           </a:rPr>
@@ -22500,7 +22406,7 @@
             </p:txBody>
           </p:sp>
         </mc:Choice>
-        <mc:Fallback>
+        <mc:Fallback xmlns="">
           <p:sp>
             <p:nvSpPr>
               <p:cNvPr id="22" name="Google Shape;56;p13">
@@ -22548,8 +22454,8 @@
           </p:sp>
         </mc:Fallback>
       </mc:AlternateContent>
-      <mc:AlternateContent xmlns:mc="http://schemas.openxmlformats.org/markup-compatibility/2006">
-        <mc:Choice xmlns:a14="http://schemas.microsoft.com/office/drawing/2010/main" Requires="a14">
+      <mc:AlternateContent xmlns:mc="http://schemas.openxmlformats.org/markup-compatibility/2006" xmlns:a14="http://schemas.microsoft.com/office/drawing/2010/main">
+        <mc:Choice Requires="a14">
           <p:sp>
             <p:nvSpPr>
               <p:cNvPr id="23" name="Google Shape;56;p13">
@@ -22892,7 +22798,7 @@
                         <m:begChr m:val="["/>
                         <m:endChr m:val="]"/>
                         <m:ctrlPr>
-                          <a:rPr lang="en-CA" sz="900" b="0" i="0" smtClean="0">
+                          <a:rPr lang="en-CA" sz="900" b="0" i="1" smtClean="0">
                             <a:latin typeface="Cambria Math" panose="02040503050406030204" pitchFamily="18" charset="0"/>
                             <a:sym typeface="Comic Sans MS"/>
                           </a:rPr>
@@ -23619,7 +23525,7 @@
             </p:txBody>
           </p:sp>
         </mc:Choice>
-        <mc:Fallback>
+        <mc:Fallback xmlns="">
           <p:sp>
             <p:nvSpPr>
               <p:cNvPr id="23" name="Google Shape;56;p13">
@@ -23667,8 +23573,8 @@
           </p:sp>
         </mc:Fallback>
       </mc:AlternateContent>
-      <mc:AlternateContent xmlns:mc="http://schemas.openxmlformats.org/markup-compatibility/2006">
-        <mc:Choice xmlns:a14="http://schemas.microsoft.com/office/drawing/2010/main" Requires="a14">
+      <mc:AlternateContent xmlns:mc="http://schemas.openxmlformats.org/markup-compatibility/2006" xmlns:a14="http://schemas.microsoft.com/office/drawing/2010/main">
+        <mc:Choice Requires="a14">
           <p:sp>
             <p:nvSpPr>
               <p:cNvPr id="24" name="Google Shape;56;p13">
@@ -23683,7 +23589,7 @@
             </p:nvSpPr>
             <p:spPr>
               <a:xfrm>
-                <a:off x="3868031" y="8608122"/>
+                <a:off x="3498058" y="8577328"/>
                 <a:ext cx="5566948" cy="323135"/>
               </a:xfrm>
               <a:prstGeom prst="rect">
@@ -23886,7 +23792,7 @@
             </p:txBody>
           </p:sp>
         </mc:Choice>
-        <mc:Fallback>
+        <mc:Fallback xmlns="">
           <p:sp>
             <p:nvSpPr>
               <p:cNvPr id="24" name="Google Shape;56;p13">
@@ -23903,7 +23809,7 @@
             </p:nvSpPr>
             <p:spPr>
               <a:xfrm>
-                <a:off x="3868031" y="8608122"/>
+                <a:off x="3498058" y="8577328"/>
                 <a:ext cx="5566948" cy="323135"/>
               </a:xfrm>
               <a:prstGeom prst="rect">
@@ -24389,13 +24295,15 @@
               </a:ext>
             </a:extLst>
           </p:cNvPr>
-          <p:cNvCxnSpPr/>
+          <p:cNvCxnSpPr>
+            <a:cxnSpLocks/>
+          </p:cNvCxnSpPr>
           <p:nvPr/>
         </p:nvCxnSpPr>
         <p:spPr>
-          <a:xfrm>
-            <a:off x="3514725" y="8372475"/>
-            <a:ext cx="0" cy="876300"/>
+          <a:xfrm flipH="1">
+            <a:off x="3512344" y="8372475"/>
+            <a:ext cx="2381" cy="651948"/>
           </a:xfrm>
           <a:prstGeom prst="line">
             <a:avLst/>
@@ -24432,7 +24340,7 @@
         </p:nvCxnSpPr>
         <p:spPr>
           <a:xfrm flipV="1">
-            <a:off x="3512344" y="9227344"/>
+            <a:off x="3531393" y="8809098"/>
             <a:ext cx="4407694" cy="21431"/>
           </a:xfrm>
           <a:prstGeom prst="line">
@@ -24897,13 +24805,15 @@
               </a:ext>
             </a:extLst>
           </p:cNvPr>
-          <p:cNvCxnSpPr/>
+          <p:cNvCxnSpPr>
+            <a:cxnSpLocks/>
+          </p:cNvCxnSpPr>
           <p:nvPr/>
         </p:nvCxnSpPr>
         <p:spPr>
           <a:xfrm flipH="1">
-            <a:off x="0" y="9024423"/>
-            <a:ext cx="3512344" cy="25592"/>
+            <a:off x="0" y="9039439"/>
+            <a:ext cx="3498058" cy="10576"/>
           </a:xfrm>
           <a:prstGeom prst="line">
             <a:avLst/>
@@ -25036,6 +24946,269 @@
           </a:fontRef>
         </p:style>
       </p:cxnSp>
+      <p:cxnSp>
+        <p:nvCxnSpPr>
+          <p:cNvPr id="5" name="Straight Connector 4">
+            <a:extLst>
+              <a:ext uri="{FF2B5EF4-FFF2-40B4-BE49-F238E27FC236}">
+                <a16:creationId xmlns:a16="http://schemas.microsoft.com/office/drawing/2014/main" id="{16B72E47-DCAD-9A8D-3A11-F6EE6E8F2677}"/>
+              </a:ext>
+            </a:extLst>
+          </p:cNvPr>
+          <p:cNvCxnSpPr>
+            <a:cxnSpLocks/>
+          </p:cNvCxnSpPr>
+          <p:nvPr/>
+        </p:nvCxnSpPr>
+        <p:spPr>
+          <a:xfrm>
+            <a:off x="3015194" y="9033425"/>
+            <a:ext cx="0" cy="1047200"/>
+          </a:xfrm>
+          <a:prstGeom prst="line">
+            <a:avLst/>
+          </a:prstGeom>
+        </p:spPr>
+        <p:style>
+          <a:lnRef idx="1">
+            <a:schemeClr val="dk1"/>
+          </a:lnRef>
+          <a:fillRef idx="0">
+            <a:schemeClr val="dk1"/>
+          </a:fillRef>
+          <a:effectRef idx="0">
+            <a:schemeClr val="dk1"/>
+          </a:effectRef>
+          <a:fontRef idx="minor">
+            <a:schemeClr val="tx1"/>
+          </a:fontRef>
+        </p:style>
+      </p:cxnSp>
+      <mc:AlternateContent xmlns:mc="http://schemas.openxmlformats.org/markup-compatibility/2006" xmlns:a14="http://schemas.microsoft.com/office/drawing/2010/main">
+        <mc:Choice Requires="a14">
+          <p:sp>
+            <p:nvSpPr>
+              <p:cNvPr id="12" name="TextBox 11">
+                <a:extLst>
+                  <a:ext uri="{FF2B5EF4-FFF2-40B4-BE49-F238E27FC236}">
+                    <a16:creationId xmlns:a16="http://schemas.microsoft.com/office/drawing/2014/main" id="{53377D50-EED0-28AA-5AB4-3898B538C8FE}"/>
+                  </a:ext>
+                </a:extLst>
+              </p:cNvPr>
+              <p:cNvSpPr txBox="1"/>
+              <p:nvPr/>
+            </p:nvSpPr>
+            <p:spPr>
+              <a:xfrm>
+                <a:off x="5327641" y="4383157"/>
+                <a:ext cx="5300794" cy="267894"/>
+              </a:xfrm>
+              <a:prstGeom prst="rect">
+                <a:avLst/>
+              </a:prstGeom>
+              <a:noFill/>
+            </p:spPr>
+            <p:txBody>
+              <a:bodyPr wrap="square" rtlCol="0">
+                <a:spAutoFit/>
+              </a:bodyPr>
+              <a:lstStyle/>
+              <a:p>
+                <a:r>
+                  <a:rPr lang="en-CA" sz="900" dirty="0">
+                    <a:latin typeface="Comic Sans MS" panose="030F0702030302020204" pitchFamily="66" charset="0"/>
+                  </a:rPr>
+                  <a:t>Validity of a PDF: </a:t>
+                </a:r>
+                <a14:m>
+                  <m:oMath xmlns:m="http://schemas.openxmlformats.org/officeDocument/2006/math">
+                    <m:sSub>
+                      <m:sSubPr>
+                        <m:ctrlPr>
+                          <a:rPr lang="en-CA" sz="900" b="0" i="1" smtClean="0">
+                            <a:latin typeface="Cambria Math" panose="02040503050406030204" pitchFamily="18" charset="0"/>
+                          </a:rPr>
+                        </m:ctrlPr>
+                      </m:sSubPr>
+                      <m:e>
+                        <m:r>
+                          <a:rPr lang="en-CA" sz="900" b="0" i="1" smtClean="0">
+                            <a:latin typeface="Cambria Math" panose="02040503050406030204" pitchFamily="18" charset="0"/>
+                          </a:rPr>
+                          <m:t>𝑓</m:t>
+                        </m:r>
+                      </m:e>
+                      <m:sub>
+                        <m:r>
+                          <a:rPr lang="en-CA" sz="900" b="0" i="1" smtClean="0">
+                            <a:latin typeface="Cambria Math" panose="02040503050406030204" pitchFamily="18" charset="0"/>
+                          </a:rPr>
+                          <m:t>𝑋</m:t>
+                        </m:r>
+                      </m:sub>
+                    </m:sSub>
+                    <m:d>
+                      <m:dPr>
+                        <m:ctrlPr>
+                          <a:rPr lang="en-CA" sz="900" b="0" i="1" smtClean="0">
+                            <a:latin typeface="Cambria Math" panose="02040503050406030204" pitchFamily="18" charset="0"/>
+                          </a:rPr>
+                        </m:ctrlPr>
+                      </m:dPr>
+                      <m:e>
+                        <m:r>
+                          <a:rPr lang="en-CA" sz="900" b="0" i="1" smtClean="0">
+                            <a:latin typeface="Cambria Math" panose="02040503050406030204" pitchFamily="18" charset="0"/>
+                          </a:rPr>
+                          <m:t>𝑥</m:t>
+                        </m:r>
+                      </m:e>
+                    </m:d>
+                    <m:r>
+                      <a:rPr lang="en-CA" sz="900" b="0" i="1" smtClean="0">
+                        <a:latin typeface="Cambria Math" panose="02040503050406030204" pitchFamily="18" charset="0"/>
+                      </a:rPr>
+                      <m:t>≥0</m:t>
+                    </m:r>
+                  </m:oMath>
+                </a14:m>
+                <a:r>
+                  <a:rPr lang="en-CA" sz="900" dirty="0">
+                    <a:latin typeface="Comic Sans MS" panose="030F0702030302020204" pitchFamily="66" charset="0"/>
+                  </a:rPr>
+                  <a:t> and </a:t>
+                </a:r>
+                <a14:m>
+                  <m:oMath xmlns:m="http://schemas.openxmlformats.org/officeDocument/2006/math">
+                    <m:nary>
+                      <m:naryPr>
+                        <m:ctrlPr>
+                          <a:rPr lang="en-CA" sz="900" b="0" i="1" smtClean="0">
+                            <a:latin typeface="Cambria Math" panose="02040503050406030204" pitchFamily="18" charset="0"/>
+                          </a:rPr>
+                        </m:ctrlPr>
+                      </m:naryPr>
+                      <m:sub>
+                        <m:r>
+                          <a:rPr lang="en-CA" sz="900" b="0" i="1" smtClean="0">
+                            <a:latin typeface="Cambria Math" panose="02040503050406030204" pitchFamily="18" charset="0"/>
+                          </a:rPr>
+                          <m:t>−∞</m:t>
+                        </m:r>
+                      </m:sub>
+                      <m:sup>
+                        <m:r>
+                          <a:rPr lang="en-CA" sz="900" b="0" i="1" smtClean="0">
+                            <a:latin typeface="Cambria Math" panose="02040503050406030204" pitchFamily="18" charset="0"/>
+                          </a:rPr>
+                          <m:t>∞</m:t>
+                        </m:r>
+                      </m:sup>
+                      <m:e>
+                        <m:sSub>
+                          <m:sSubPr>
+                            <m:ctrlPr>
+                              <a:rPr lang="en-CA" sz="900" b="0" i="1" smtClean="0">
+                                <a:latin typeface="Cambria Math" panose="02040503050406030204" pitchFamily="18" charset="0"/>
+                              </a:rPr>
+                            </m:ctrlPr>
+                          </m:sSubPr>
+                          <m:e>
+                            <m:r>
+                              <a:rPr lang="en-CA" sz="900" b="0" i="1" smtClean="0">
+                                <a:latin typeface="Cambria Math" panose="02040503050406030204" pitchFamily="18" charset="0"/>
+                              </a:rPr>
+                              <m:t>𝑓</m:t>
+                            </m:r>
+                          </m:e>
+                          <m:sub>
+                            <m:r>
+                              <a:rPr lang="en-CA" sz="900" b="0" i="1" smtClean="0">
+                                <a:latin typeface="Cambria Math" panose="02040503050406030204" pitchFamily="18" charset="0"/>
+                              </a:rPr>
+                              <m:t>𝑋</m:t>
+                            </m:r>
+                          </m:sub>
+                        </m:sSub>
+                        <m:d>
+                          <m:dPr>
+                            <m:ctrlPr>
+                              <a:rPr lang="en-CA" sz="900" b="0" i="1" smtClean="0">
+                                <a:latin typeface="Cambria Math" panose="02040503050406030204" pitchFamily="18" charset="0"/>
+                              </a:rPr>
+                            </m:ctrlPr>
+                          </m:dPr>
+                          <m:e>
+                            <m:r>
+                              <a:rPr lang="en-CA" sz="900" b="0" i="1" smtClean="0">
+                                <a:latin typeface="Cambria Math" panose="02040503050406030204" pitchFamily="18" charset="0"/>
+                              </a:rPr>
+                              <m:t>𝑥</m:t>
+                            </m:r>
+                          </m:e>
+                        </m:d>
+                      </m:e>
+                    </m:nary>
+                    <m:r>
+                      <a:rPr lang="en-CA" sz="900" b="0" i="1" smtClean="0">
+                        <a:latin typeface="Cambria Math" panose="02040503050406030204" pitchFamily="18" charset="0"/>
+                      </a:rPr>
+                      <m:t>=1</m:t>
+                    </m:r>
+                  </m:oMath>
+                </a14:m>
+                <a:endParaRPr lang="en-CA" sz="900" b="0" dirty="0">
+                  <a:latin typeface="Comic Sans MS" panose="030F0702030302020204" pitchFamily="66" charset="0"/>
+                </a:endParaRPr>
+              </a:p>
+            </p:txBody>
+          </p:sp>
+        </mc:Choice>
+        <mc:Fallback xmlns="">
+          <p:sp>
+            <p:nvSpPr>
+              <p:cNvPr id="12" name="TextBox 11">
+                <a:extLst>
+                  <a:ext uri="{FF2B5EF4-FFF2-40B4-BE49-F238E27FC236}">
+                    <a16:creationId xmlns:a16="http://schemas.microsoft.com/office/drawing/2014/main" id="{53377D50-EED0-28AA-5AB4-3898B538C8FE}"/>
+                  </a:ext>
+                </a:extLst>
+              </p:cNvPr>
+              <p:cNvSpPr txBox="1">
+                <a:spLocks noRot="1" noChangeAspect="1" noMove="1" noResize="1" noEditPoints="1" noAdjustHandles="1" noChangeArrowheads="1" noChangeShapeType="1" noTextEdit="1"/>
+              </p:cNvSpPr>
+              <p:nvPr/>
+            </p:nvSpPr>
+            <p:spPr>
+              <a:xfrm>
+                <a:off x="5327641" y="4383157"/>
+                <a:ext cx="5300794" cy="267894"/>
+              </a:xfrm>
+              <a:prstGeom prst="rect">
+                <a:avLst/>
+              </a:prstGeom>
+              <a:blipFill>
+                <a:blip r:embed="rId20"/>
+                <a:stretch>
+                  <a:fillRect t="-90909" b="-145455"/>
+                </a:stretch>
+              </a:blipFill>
+            </p:spPr>
+            <p:txBody>
+              <a:bodyPr/>
+              <a:lstStyle/>
+              <a:p>
+                <a:r>
+                  <a:rPr lang="en-CA">
+                    <a:noFill/>
+                  </a:rPr>
+                  <a:t> </a:t>
+                </a:r>
+              </a:p>
+            </p:txBody>
+          </p:sp>
+        </mc:Fallback>
+      </mc:AlternateContent>
     </p:spTree>
   </p:cSld>
   <p:clrMapOvr>

</xml_diff>